<commit_message>
3 Last questions answered.
</commit_message>
<xml_diff>
--- a/RASD presentation.pptx
+++ b/RASD presentation.pptx
@@ -4,6 +4,9 @@
   <p:sldMasterIdLst>
     <p:sldMasterId id="2147483660" r:id="rId1"/>
   </p:sldMasterIdLst>
+  <p:notesMasterIdLst>
+    <p:notesMasterId r:id="rId9"/>
+  </p:notesMasterIdLst>
   <p:sldIdLst>
     <p:sldId id="256" r:id="rId2"/>
     <p:sldId id="257" r:id="rId3"/>
@@ -110,11 +113,366 @@
       </a:defRPr>
     </a:lvl9pPr>
   </p:defaultTextStyle>
+  <p:extLst>
+    <p:ext uri="{EFAFB233-063F-42B5-8137-9DF3F51BA10A}">
+      <p15:sldGuideLst xmlns:p15="http://schemas.microsoft.com/office/powerpoint/2012/main"/>
+    </p:ext>
+  </p:extLst>
 </p:presentation>
 </file>
 
 <file path=ppt/revisionInfo.xml><?xml version="1.0" encoding="utf-8"?>
 <p1510:revInfo xmlns:a="http://schemas.openxmlformats.org/drawingml/2006/main" xmlns:r="http://schemas.openxmlformats.org/officeDocument/2006/relationships" xmlns:p1510="http://schemas.microsoft.com/office/powerpoint/2015/10/main"/>
+</file>
+
+<file path=ppt/notesMasters/notesMaster1.xml><?xml version="1.0" encoding="utf-8"?>
+<p:notesMaster xmlns:a="http://schemas.openxmlformats.org/drawingml/2006/main" xmlns:r="http://schemas.openxmlformats.org/officeDocument/2006/relationships" xmlns:p="http://schemas.openxmlformats.org/presentationml/2006/main">
+  <p:cSld>
+    <p:bg>
+      <p:bgRef idx="1001">
+        <a:schemeClr val="bg1"/>
+      </p:bgRef>
+    </p:bg>
+    <p:spTree>
+      <p:nvGrpSpPr>
+        <p:cNvPr id="1" name=""/>
+        <p:cNvGrpSpPr/>
+        <p:nvPr/>
+      </p:nvGrpSpPr>
+      <p:grpSpPr>
+        <a:xfrm>
+          <a:off x="0" y="0"/>
+          <a:ext cx="0" cy="0"/>
+          <a:chOff x="0" y="0"/>
+          <a:chExt cx="0" cy="0"/>
+        </a:xfrm>
+      </p:grpSpPr>
+      <p:sp>
+        <p:nvSpPr>
+          <p:cNvPr id="2" name="Marcador de encabezado 1"/>
+          <p:cNvSpPr>
+            <a:spLocks noGrp="1"/>
+          </p:cNvSpPr>
+          <p:nvPr>
+            <p:ph type="hdr" sz="quarter"/>
+          </p:nvPr>
+        </p:nvSpPr>
+        <p:spPr>
+          <a:xfrm>
+            <a:off x="0" y="0"/>
+            <a:ext cx="2971800" cy="458788"/>
+          </a:xfrm>
+          <a:prstGeom prst="rect">
+            <a:avLst/>
+          </a:prstGeom>
+        </p:spPr>
+        <p:txBody>
+          <a:bodyPr vert="horz" lIns="91440" tIns="45720" rIns="91440" bIns="45720" rtlCol="0"/>
+          <a:lstStyle>
+            <a:lvl1pPr algn="l">
+              <a:defRPr sz="1200"/>
+            </a:lvl1pPr>
+          </a:lstStyle>
+          <a:p>
+            <a:endParaRPr lang="es-ES_tradnl"/>
+          </a:p>
+        </p:txBody>
+      </p:sp>
+      <p:sp>
+        <p:nvSpPr>
+          <p:cNvPr id="3" name="Marcador de fecha 2"/>
+          <p:cNvSpPr>
+            <a:spLocks noGrp="1"/>
+          </p:cNvSpPr>
+          <p:nvPr>
+            <p:ph type="dt" idx="1"/>
+          </p:nvPr>
+        </p:nvSpPr>
+        <p:spPr>
+          <a:xfrm>
+            <a:off x="3884613" y="0"/>
+            <a:ext cx="2971800" cy="458788"/>
+          </a:xfrm>
+          <a:prstGeom prst="rect">
+            <a:avLst/>
+          </a:prstGeom>
+        </p:spPr>
+        <p:txBody>
+          <a:bodyPr vert="horz" lIns="91440" tIns="45720" rIns="91440" bIns="45720" rtlCol="0"/>
+          <a:lstStyle>
+            <a:lvl1pPr algn="r">
+              <a:defRPr sz="1200"/>
+            </a:lvl1pPr>
+          </a:lstStyle>
+          <a:p>
+            <a:fld id="{D61A2270-FB9C-3345-8361-06754ADDD0F6}" type="datetimeFigureOut">
+              <a:rPr lang="es-ES_tradnl" smtClean="0"/>
+              <a:t>7/11/17</a:t>
+            </a:fld>
+            <a:endParaRPr lang="es-ES_tradnl"/>
+          </a:p>
+        </p:txBody>
+      </p:sp>
+      <p:sp>
+        <p:nvSpPr>
+          <p:cNvPr id="4" name="Marcador de imagen de diapositiva 3"/>
+          <p:cNvSpPr>
+            <a:spLocks noGrp="1" noRot="1" noChangeAspect="1"/>
+          </p:cNvSpPr>
+          <p:nvPr>
+            <p:ph type="sldImg" idx="2"/>
+          </p:nvPr>
+        </p:nvSpPr>
+        <p:spPr>
+          <a:xfrm>
+            <a:off x="685800" y="1143000"/>
+            <a:ext cx="5486400" cy="3086100"/>
+          </a:xfrm>
+          <a:prstGeom prst="rect">
+            <a:avLst/>
+          </a:prstGeom>
+          <a:noFill/>
+          <a:ln w="12700">
+            <a:solidFill>
+              <a:prstClr val="black"/>
+            </a:solidFill>
+          </a:ln>
+        </p:spPr>
+        <p:txBody>
+          <a:bodyPr vert="horz" lIns="91440" tIns="45720" rIns="91440" bIns="45720" rtlCol="0" anchor="ctr"/>
+          <a:lstStyle/>
+          <a:p>
+            <a:endParaRPr lang="es-ES_tradnl"/>
+          </a:p>
+        </p:txBody>
+      </p:sp>
+      <p:sp>
+        <p:nvSpPr>
+          <p:cNvPr id="5" name="Marcador de notas 4"/>
+          <p:cNvSpPr>
+            <a:spLocks noGrp="1"/>
+          </p:cNvSpPr>
+          <p:nvPr>
+            <p:ph type="body" sz="quarter" idx="3"/>
+          </p:nvPr>
+        </p:nvSpPr>
+        <p:spPr>
+          <a:xfrm>
+            <a:off x="685800" y="4400550"/>
+            <a:ext cx="5486400" cy="3600450"/>
+          </a:xfrm>
+          <a:prstGeom prst="rect">
+            <a:avLst/>
+          </a:prstGeom>
+        </p:spPr>
+        <p:txBody>
+          <a:bodyPr vert="horz" lIns="91440" tIns="45720" rIns="91440" bIns="45720" rtlCol="0"/>
+          <a:lstStyle/>
+          <a:p>
+            <a:pPr lvl="0"/>
+            <a:r>
+              <a:rPr lang="es-ES_tradnl" smtClean="0"/>
+              <a:t>Haga clic para modificar el estilo de texto del patrón</a:t>
+            </a:r>
+          </a:p>
+          <a:p>
+            <a:pPr lvl="1"/>
+            <a:r>
+              <a:rPr lang="es-ES_tradnl" smtClean="0"/>
+              <a:t>Segundo nivel</a:t>
+            </a:r>
+          </a:p>
+          <a:p>
+            <a:pPr lvl="2"/>
+            <a:r>
+              <a:rPr lang="es-ES_tradnl" smtClean="0"/>
+              <a:t>Tercer nivel</a:t>
+            </a:r>
+          </a:p>
+          <a:p>
+            <a:pPr lvl="3"/>
+            <a:r>
+              <a:rPr lang="es-ES_tradnl" smtClean="0"/>
+              <a:t>Cuarto nivel</a:t>
+            </a:r>
+          </a:p>
+          <a:p>
+            <a:pPr lvl="4"/>
+            <a:r>
+              <a:rPr lang="es-ES_tradnl" smtClean="0"/>
+              <a:t>Quinto nivel</a:t>
+            </a:r>
+            <a:endParaRPr lang="es-ES_tradnl"/>
+          </a:p>
+        </p:txBody>
+      </p:sp>
+      <p:sp>
+        <p:nvSpPr>
+          <p:cNvPr id="6" name="Marcador de pie de página 5"/>
+          <p:cNvSpPr>
+            <a:spLocks noGrp="1"/>
+          </p:cNvSpPr>
+          <p:nvPr>
+            <p:ph type="ftr" sz="quarter" idx="4"/>
+          </p:nvPr>
+        </p:nvSpPr>
+        <p:spPr>
+          <a:xfrm>
+            <a:off x="0" y="8685213"/>
+            <a:ext cx="2971800" cy="458787"/>
+          </a:xfrm>
+          <a:prstGeom prst="rect">
+            <a:avLst/>
+          </a:prstGeom>
+        </p:spPr>
+        <p:txBody>
+          <a:bodyPr vert="horz" lIns="91440" tIns="45720" rIns="91440" bIns="45720" rtlCol="0" anchor="b"/>
+          <a:lstStyle>
+            <a:lvl1pPr algn="l">
+              <a:defRPr sz="1200"/>
+            </a:lvl1pPr>
+          </a:lstStyle>
+          <a:p>
+            <a:endParaRPr lang="es-ES_tradnl"/>
+          </a:p>
+        </p:txBody>
+      </p:sp>
+      <p:sp>
+        <p:nvSpPr>
+          <p:cNvPr id="7" name="Marcador de número de diapositiva 6"/>
+          <p:cNvSpPr>
+            <a:spLocks noGrp="1"/>
+          </p:cNvSpPr>
+          <p:nvPr>
+            <p:ph type="sldNum" sz="quarter" idx="5"/>
+          </p:nvPr>
+        </p:nvSpPr>
+        <p:spPr>
+          <a:xfrm>
+            <a:off x="3884613" y="8685213"/>
+            <a:ext cx="2971800" cy="458787"/>
+          </a:xfrm>
+          <a:prstGeom prst="rect">
+            <a:avLst/>
+          </a:prstGeom>
+        </p:spPr>
+        <p:txBody>
+          <a:bodyPr vert="horz" lIns="91440" tIns="45720" rIns="91440" bIns="45720" rtlCol="0" anchor="b"/>
+          <a:lstStyle>
+            <a:lvl1pPr algn="r">
+              <a:defRPr sz="1200"/>
+            </a:lvl1pPr>
+          </a:lstStyle>
+          <a:p>
+            <a:fld id="{F374FBF3-DBA2-654C-938D-CA446CD4A681}" type="slidenum">
+              <a:rPr lang="es-ES_tradnl" smtClean="0"/>
+              <a:t>‹Nr.›</a:t>
+            </a:fld>
+            <a:endParaRPr lang="es-ES_tradnl"/>
+          </a:p>
+        </p:txBody>
+      </p:sp>
+    </p:spTree>
+    <p:extLst>
+      <p:ext uri="{BB962C8B-B14F-4D97-AF65-F5344CB8AC3E}">
+        <p14:creationId xmlns:p14="http://schemas.microsoft.com/office/powerpoint/2010/main" val="2104148329"/>
+      </p:ext>
+    </p:extLst>
+  </p:cSld>
+  <p:clrMap bg1="lt1" tx1="dk1" bg2="lt2" tx2="dk2" accent1="accent1" accent2="accent2" accent3="accent3" accent4="accent4" accent5="accent5" accent6="accent6" hlink="hlink" folHlink="folHlink"/>
+  <p:notesStyle>
+    <a:lvl1pPr marL="0" algn="l" defTabSz="914400" rtl="0" eaLnBrk="1" latinLnBrk="0" hangingPunct="1">
+      <a:defRPr sz="1200" kern="1200">
+        <a:solidFill>
+          <a:schemeClr val="tx1"/>
+        </a:solidFill>
+        <a:latin typeface="+mn-lt"/>
+        <a:ea typeface="+mn-ea"/>
+        <a:cs typeface="+mn-cs"/>
+      </a:defRPr>
+    </a:lvl1pPr>
+    <a:lvl2pPr marL="457200" algn="l" defTabSz="914400" rtl="0" eaLnBrk="1" latinLnBrk="0" hangingPunct="1">
+      <a:defRPr sz="1200" kern="1200">
+        <a:solidFill>
+          <a:schemeClr val="tx1"/>
+        </a:solidFill>
+        <a:latin typeface="+mn-lt"/>
+        <a:ea typeface="+mn-ea"/>
+        <a:cs typeface="+mn-cs"/>
+      </a:defRPr>
+    </a:lvl2pPr>
+    <a:lvl3pPr marL="914400" algn="l" defTabSz="914400" rtl="0" eaLnBrk="1" latinLnBrk="0" hangingPunct="1">
+      <a:defRPr sz="1200" kern="1200">
+        <a:solidFill>
+          <a:schemeClr val="tx1"/>
+        </a:solidFill>
+        <a:latin typeface="+mn-lt"/>
+        <a:ea typeface="+mn-ea"/>
+        <a:cs typeface="+mn-cs"/>
+      </a:defRPr>
+    </a:lvl3pPr>
+    <a:lvl4pPr marL="1371600" algn="l" defTabSz="914400" rtl="0" eaLnBrk="1" latinLnBrk="0" hangingPunct="1">
+      <a:defRPr sz="1200" kern="1200">
+        <a:solidFill>
+          <a:schemeClr val="tx1"/>
+        </a:solidFill>
+        <a:latin typeface="+mn-lt"/>
+        <a:ea typeface="+mn-ea"/>
+        <a:cs typeface="+mn-cs"/>
+      </a:defRPr>
+    </a:lvl4pPr>
+    <a:lvl5pPr marL="1828800" algn="l" defTabSz="914400" rtl="0" eaLnBrk="1" latinLnBrk="0" hangingPunct="1">
+      <a:defRPr sz="1200" kern="1200">
+        <a:solidFill>
+          <a:schemeClr val="tx1"/>
+        </a:solidFill>
+        <a:latin typeface="+mn-lt"/>
+        <a:ea typeface="+mn-ea"/>
+        <a:cs typeface="+mn-cs"/>
+      </a:defRPr>
+    </a:lvl5pPr>
+    <a:lvl6pPr marL="2286000" algn="l" defTabSz="914400" rtl="0" eaLnBrk="1" latinLnBrk="0" hangingPunct="1">
+      <a:defRPr sz="1200" kern="1200">
+        <a:solidFill>
+          <a:schemeClr val="tx1"/>
+        </a:solidFill>
+        <a:latin typeface="+mn-lt"/>
+        <a:ea typeface="+mn-ea"/>
+        <a:cs typeface="+mn-cs"/>
+      </a:defRPr>
+    </a:lvl6pPr>
+    <a:lvl7pPr marL="2743200" algn="l" defTabSz="914400" rtl="0" eaLnBrk="1" latinLnBrk="0" hangingPunct="1">
+      <a:defRPr sz="1200" kern="1200">
+        <a:solidFill>
+          <a:schemeClr val="tx1"/>
+        </a:solidFill>
+        <a:latin typeface="+mn-lt"/>
+        <a:ea typeface="+mn-ea"/>
+        <a:cs typeface="+mn-cs"/>
+      </a:defRPr>
+    </a:lvl7pPr>
+    <a:lvl8pPr marL="3200400" algn="l" defTabSz="914400" rtl="0" eaLnBrk="1" latinLnBrk="0" hangingPunct="1">
+      <a:defRPr sz="1200" kern="1200">
+        <a:solidFill>
+          <a:schemeClr val="tx1"/>
+        </a:solidFill>
+        <a:latin typeface="+mn-lt"/>
+        <a:ea typeface="+mn-ea"/>
+        <a:cs typeface="+mn-cs"/>
+      </a:defRPr>
+    </a:lvl8pPr>
+    <a:lvl9pPr marL="3657600" algn="l" defTabSz="914400" rtl="0" eaLnBrk="1" latinLnBrk="0" hangingPunct="1">
+      <a:defRPr sz="1200" kern="1200">
+        <a:solidFill>
+          <a:schemeClr val="tx1"/>
+        </a:solidFill>
+        <a:latin typeface="+mn-lt"/>
+        <a:ea typeface="+mn-ea"/>
+        <a:cs typeface="+mn-cs"/>
+      </a:defRPr>
+    </a:lvl9pPr>
+  </p:notesStyle>
+</p:notesMaster>
 </file>
 
 <file path=ppt/slideLayouts/slideLayout1.xml><?xml version="1.0" encoding="utf-8"?>
@@ -452,7 +810,7 @@
           <a:p>
             <a:fld id="{54249686-386F-408B-B15A-61AE341C182A}" type="datetimeFigureOut">
               <a:rPr lang="en-BZ" smtClean="0"/>
-              <a:t>07/11/2017</a:t>
+              <a:t>07/11/17</a:t>
             </a:fld>
             <a:endParaRPr lang="en-BZ"/>
           </a:p>
@@ -550,7 +908,7 @@
           <a:p>
             <a:fld id="{4E09E580-52D8-449A-A0D3-986EB83CD611}" type="slidenum">
               <a:rPr lang="en-BZ" smtClean="0"/>
-              <a:t>‹#›</a:t>
+              <a:t>‹Nr.›</a:t>
             </a:fld>
             <a:endParaRPr lang="en-BZ"/>
           </a:p>
@@ -1540,7 +1898,7 @@
           <a:p>
             <a:fld id="{54249686-386F-408B-B15A-61AE341C182A}" type="datetimeFigureOut">
               <a:rPr lang="en-BZ" smtClean="0"/>
-              <a:t>07/11/2017</a:t>
+              <a:t>07/11/17</a:t>
             </a:fld>
             <a:endParaRPr lang="en-BZ"/>
           </a:p>
@@ -1618,7 +1976,7 @@
           <a:p>
             <a:fld id="{4E09E580-52D8-449A-A0D3-986EB83CD611}" type="slidenum">
               <a:rPr lang="en-BZ" smtClean="0"/>
-              <a:t>‹#›</a:t>
+              <a:t>‹Nr.›</a:t>
             </a:fld>
             <a:endParaRPr lang="en-BZ"/>
           </a:p>
@@ -2520,7 +2878,7 @@
           <a:p>
             <a:fld id="{54249686-386F-408B-B15A-61AE341C182A}" type="datetimeFigureOut">
               <a:rPr lang="en-BZ" smtClean="0"/>
-              <a:t>07/11/2017</a:t>
+              <a:t>07/11/17</a:t>
             </a:fld>
             <a:endParaRPr lang="en-BZ"/>
           </a:p>
@@ -2598,7 +2956,7 @@
           <a:p>
             <a:fld id="{4E09E580-52D8-449A-A0D3-986EB83CD611}" type="slidenum">
               <a:rPr lang="en-BZ" smtClean="0"/>
-              <a:t>‹#›</a:t>
+              <a:t>‹Nr.›</a:t>
             </a:fld>
             <a:endParaRPr lang="en-BZ"/>
           </a:p>
@@ -3654,7 +4012,7 @@
           <a:p>
             <a:fld id="{54249686-386F-408B-B15A-61AE341C182A}" type="datetimeFigureOut">
               <a:rPr lang="en-BZ" smtClean="0"/>
-              <a:t>07/11/2017</a:t>
+              <a:t>07/11/17</a:t>
             </a:fld>
             <a:endParaRPr lang="en-BZ"/>
           </a:p>
@@ -3732,7 +4090,7 @@
           <a:p>
             <a:fld id="{4E09E580-52D8-449A-A0D3-986EB83CD611}" type="slidenum">
               <a:rPr lang="en-BZ" smtClean="0"/>
-              <a:t>‹#›</a:t>
+              <a:t>‹Nr.›</a:t>
             </a:fld>
             <a:endParaRPr lang="en-BZ"/>
           </a:p>
@@ -4687,7 +5045,7 @@
           <a:p>
             <a:fld id="{54249686-386F-408B-B15A-61AE341C182A}" type="datetimeFigureOut">
               <a:rPr lang="en-BZ" smtClean="0"/>
-              <a:t>07/11/2017</a:t>
+              <a:t>07/11/17</a:t>
             </a:fld>
             <a:endParaRPr lang="en-BZ"/>
           </a:p>
@@ -4765,7 +5123,7 @@
           <a:p>
             <a:fld id="{4E09E580-52D8-449A-A0D3-986EB83CD611}" type="slidenum">
               <a:rPr lang="en-BZ" smtClean="0"/>
-              <a:t>‹#›</a:t>
+              <a:t>‹Nr.›</a:t>
             </a:fld>
             <a:endParaRPr lang="en-BZ"/>
           </a:p>
@@ -5347,7 +5705,7 @@
           <a:p>
             <a:fld id="{54249686-386F-408B-B15A-61AE341C182A}" type="datetimeFigureOut">
               <a:rPr lang="en-BZ" smtClean="0"/>
-              <a:t>07/11/2017</a:t>
+              <a:t>07/11/17</a:t>
             </a:fld>
             <a:endParaRPr lang="en-BZ"/>
           </a:p>
@@ -5389,7 +5747,7 @@
           <a:p>
             <a:fld id="{4E09E580-52D8-449A-A0D3-986EB83CD611}" type="slidenum">
               <a:rPr lang="en-BZ" smtClean="0"/>
-              <a:t>‹#›</a:t>
+              <a:t>‹Nr.›</a:t>
             </a:fld>
             <a:endParaRPr lang="en-BZ"/>
           </a:p>
@@ -6208,7 +6566,7 @@
           <a:p>
             <a:fld id="{54249686-386F-408B-B15A-61AE341C182A}" type="datetimeFigureOut">
               <a:rPr lang="en-BZ" smtClean="0"/>
-              <a:t>07/11/2017</a:t>
+              <a:t>07/11/17</a:t>
             </a:fld>
             <a:endParaRPr lang="en-BZ"/>
           </a:p>
@@ -6255,7 +6613,7 @@
           <a:p>
             <a:fld id="{4E09E580-52D8-449A-A0D3-986EB83CD611}" type="slidenum">
               <a:rPr lang="en-BZ" smtClean="0"/>
-              <a:t>‹#›</a:t>
+              <a:t>‹Nr.›</a:t>
             </a:fld>
             <a:endParaRPr lang="en-BZ"/>
           </a:p>
@@ -6398,7 +6756,7 @@
           <a:p>
             <a:fld id="{54249686-386F-408B-B15A-61AE341C182A}" type="datetimeFigureOut">
               <a:rPr lang="en-BZ" smtClean="0"/>
-              <a:t>07/11/2017</a:t>
+              <a:t>07/11/17</a:t>
             </a:fld>
             <a:endParaRPr lang="en-BZ"/>
           </a:p>
@@ -6440,7 +6798,7 @@
           <a:p>
             <a:fld id="{4E09E580-52D8-449A-A0D3-986EB83CD611}" type="slidenum">
               <a:rPr lang="en-BZ" smtClean="0"/>
-              <a:t>‹#›</a:t>
+              <a:t>‹Nr.›</a:t>
             </a:fld>
             <a:endParaRPr lang="en-BZ"/>
           </a:p>
@@ -7370,7 +7728,7 @@
           <a:p>
             <a:fld id="{54249686-386F-408B-B15A-61AE341C182A}" type="datetimeFigureOut">
               <a:rPr lang="en-BZ" smtClean="0"/>
-              <a:t>07/11/2017</a:t>
+              <a:t>07/11/17</a:t>
             </a:fld>
             <a:endParaRPr lang="en-BZ"/>
           </a:p>
@@ -7448,7 +7806,7 @@
           <a:p>
             <a:fld id="{4E09E580-52D8-449A-A0D3-986EB83CD611}" type="slidenum">
               <a:rPr lang="en-BZ" smtClean="0"/>
-              <a:t>‹#›</a:t>
+              <a:t>‹Nr.›</a:t>
             </a:fld>
             <a:endParaRPr lang="en-BZ"/>
           </a:p>
@@ -7581,7 +7939,7 @@
           <a:p>
             <a:fld id="{54249686-386F-408B-B15A-61AE341C182A}" type="datetimeFigureOut">
               <a:rPr lang="en-BZ" smtClean="0"/>
-              <a:t>07/11/2017</a:t>
+              <a:t>07/11/17</a:t>
             </a:fld>
             <a:endParaRPr lang="en-BZ"/>
           </a:p>
@@ -7623,7 +7981,7 @@
           <a:p>
             <a:fld id="{4E09E580-52D8-449A-A0D3-986EB83CD611}" type="slidenum">
               <a:rPr lang="en-BZ" smtClean="0"/>
-              <a:t>‹#›</a:t>
+              <a:t>‹Nr.›</a:t>
             </a:fld>
             <a:endParaRPr lang="en-BZ"/>
           </a:p>
@@ -8615,7 +8973,7 @@
           <a:p>
             <a:fld id="{54249686-386F-408B-B15A-61AE341C182A}" type="datetimeFigureOut">
               <a:rPr lang="en-BZ" smtClean="0"/>
-              <a:t>07/11/2017</a:t>
+              <a:t>07/11/17</a:t>
             </a:fld>
             <a:endParaRPr lang="en-BZ"/>
           </a:p>
@@ -8693,7 +9051,7 @@
           <a:p>
             <a:fld id="{4E09E580-52D8-449A-A0D3-986EB83CD611}" type="slidenum">
               <a:rPr lang="en-BZ" smtClean="0"/>
-              <a:t>‹#›</a:t>
+              <a:t>‹Nr.›</a:t>
             </a:fld>
             <a:endParaRPr lang="en-BZ"/>
           </a:p>
@@ -8887,7 +9245,7 @@
           <a:p>
             <a:fld id="{54249686-386F-408B-B15A-61AE341C182A}" type="datetimeFigureOut">
               <a:rPr lang="en-BZ" smtClean="0"/>
-              <a:t>07/11/2017</a:t>
+              <a:t>07/11/17</a:t>
             </a:fld>
             <a:endParaRPr lang="en-BZ"/>
           </a:p>
@@ -8929,7 +9287,7 @@
           <a:p>
             <a:fld id="{4E09E580-52D8-449A-A0D3-986EB83CD611}" type="slidenum">
               <a:rPr lang="en-BZ" smtClean="0"/>
-              <a:t>‹#›</a:t>
+              <a:t>‹Nr.›</a:t>
             </a:fld>
             <a:endParaRPr lang="en-BZ"/>
           </a:p>
@@ -9297,7 +9655,7 @@
           <a:p>
             <a:fld id="{54249686-386F-408B-B15A-61AE341C182A}" type="datetimeFigureOut">
               <a:rPr lang="en-BZ" smtClean="0"/>
-              <a:t>07/11/2017</a:t>
+              <a:t>07/11/17</a:t>
             </a:fld>
             <a:endParaRPr lang="en-BZ"/>
           </a:p>
@@ -9339,7 +9697,7 @@
           <a:p>
             <a:fld id="{4E09E580-52D8-449A-A0D3-986EB83CD611}" type="slidenum">
               <a:rPr lang="en-BZ" smtClean="0"/>
-              <a:t>‹#›</a:t>
+              <a:t>‹Nr.›</a:t>
             </a:fld>
             <a:endParaRPr lang="en-BZ"/>
           </a:p>
@@ -9424,7 +9782,7 @@
           <a:p>
             <a:fld id="{54249686-386F-408B-B15A-61AE341C182A}" type="datetimeFigureOut">
               <a:rPr lang="en-BZ" smtClean="0"/>
-              <a:t>07/11/2017</a:t>
+              <a:t>07/11/17</a:t>
             </a:fld>
             <a:endParaRPr lang="en-BZ"/>
           </a:p>
@@ -9466,7 +9824,7 @@
           <a:p>
             <a:fld id="{4E09E580-52D8-449A-A0D3-986EB83CD611}" type="slidenum">
               <a:rPr lang="en-BZ" smtClean="0"/>
-              <a:t>‹#›</a:t>
+              <a:t>‹Nr.›</a:t>
             </a:fld>
             <a:endParaRPr lang="en-BZ"/>
           </a:p>
@@ -9519,7 +9877,7 @@
           <a:p>
             <a:fld id="{54249686-386F-408B-B15A-61AE341C182A}" type="datetimeFigureOut">
               <a:rPr lang="en-BZ" smtClean="0"/>
-              <a:t>07/11/2017</a:t>
+              <a:t>07/11/17</a:t>
             </a:fld>
             <a:endParaRPr lang="en-BZ"/>
           </a:p>
@@ -9597,7 +9955,7 @@
           <a:p>
             <a:fld id="{4E09E580-52D8-449A-A0D3-986EB83CD611}" type="slidenum">
               <a:rPr lang="en-BZ" smtClean="0"/>
-              <a:t>‹#›</a:t>
+              <a:t>‹Nr.›</a:t>
             </a:fld>
             <a:endParaRPr lang="en-BZ"/>
           </a:p>
@@ -10600,7 +10958,7 @@
           <a:p>
             <a:fld id="{54249686-386F-408B-B15A-61AE341C182A}" type="datetimeFigureOut">
               <a:rPr lang="en-BZ" smtClean="0"/>
-              <a:t>07/11/2017</a:t>
+              <a:t>07/11/17</a:t>
             </a:fld>
             <a:endParaRPr lang="en-BZ"/>
           </a:p>
@@ -10678,7 +11036,7 @@
           <a:p>
             <a:fld id="{4E09E580-52D8-449A-A0D3-986EB83CD611}" type="slidenum">
               <a:rPr lang="en-BZ" smtClean="0"/>
-              <a:t>‹#›</a:t>
+              <a:t>‹Nr.›</a:t>
             </a:fld>
             <a:endParaRPr lang="en-BZ"/>
           </a:p>
@@ -11708,7 +12066,7 @@
           <a:p>
             <a:fld id="{54249686-386F-408B-B15A-61AE341C182A}" type="datetimeFigureOut">
               <a:rPr lang="en-BZ" smtClean="0"/>
-              <a:t>07/11/2017</a:t>
+              <a:t>07/11/17</a:t>
             </a:fld>
             <a:endParaRPr lang="en-BZ"/>
           </a:p>
@@ -11786,7 +12144,7 @@
           <a:p>
             <a:fld id="{4E09E580-52D8-449A-A0D3-986EB83CD611}" type="slidenum">
               <a:rPr lang="en-BZ" smtClean="0"/>
-              <a:t>‹#›</a:t>
+              <a:t>‹Nr.›</a:t>
             </a:fld>
             <a:endParaRPr lang="en-BZ"/>
           </a:p>
@@ -12705,7 +13063,7 @@
           <a:p>
             <a:fld id="{54249686-386F-408B-B15A-61AE341C182A}" type="datetimeFigureOut">
               <a:rPr lang="en-BZ" smtClean="0"/>
-              <a:t>07/11/2017</a:t>
+              <a:t>07/11/17</a:t>
             </a:fld>
             <a:endParaRPr lang="en-BZ"/>
           </a:p>
@@ -12815,7 +13173,7 @@
           <a:p>
             <a:fld id="{4E09E580-52D8-449A-A0D3-986EB83CD611}" type="slidenum">
               <a:rPr lang="en-BZ" smtClean="0"/>
-              <a:t>‹#›</a:t>
+              <a:t>‹Nr.›</a:t>
             </a:fld>
             <a:endParaRPr lang="en-BZ"/>
           </a:p>
@@ -13269,7 +13627,7 @@
           <p:cNvPr id="2" name="Заглавие 1">
             <a:extLst>
               <a:ext uri="{FF2B5EF4-FFF2-40B4-BE49-F238E27FC236}">
-                <a16:creationId xmlns:a16="http://schemas.microsoft.com/office/drawing/2014/main" id="{837F294C-244A-454C-B2F6-AFEB2A153203}"/>
+                <a16:creationId xmlns:a16="http://schemas.microsoft.com/office/drawing/2014/main" xmlns="" id="{837F294C-244A-454C-B2F6-AFEB2A153203}"/>
               </a:ext>
             </a:extLst>
           </p:cNvPr>
@@ -13298,7 +13656,7 @@
           <p:cNvPr id="3" name="Подзаглавие 2">
             <a:extLst>
               <a:ext uri="{FF2B5EF4-FFF2-40B4-BE49-F238E27FC236}">
-                <a16:creationId xmlns:a16="http://schemas.microsoft.com/office/drawing/2014/main" id="{08CC4CC9-14A7-41B6-AF12-F10C62367B12}"/>
+                <a16:creationId xmlns:a16="http://schemas.microsoft.com/office/drawing/2014/main" xmlns="" id="{08CC4CC9-14A7-41B6-AF12-F10C62367B12}"/>
               </a:ext>
             </a:extLst>
           </p:cNvPr>
@@ -13364,7 +13722,7 @@
           <p:cNvPr id="2" name="Заглавие 1">
             <a:extLst>
               <a:ext uri="{FF2B5EF4-FFF2-40B4-BE49-F238E27FC236}">
-                <a16:creationId xmlns:a16="http://schemas.microsoft.com/office/drawing/2014/main" id="{DD308E70-63AF-431F-845B-EF09FF826D86}"/>
+                <a16:creationId xmlns:a16="http://schemas.microsoft.com/office/drawing/2014/main" xmlns="" id="{DD308E70-63AF-431F-845B-EF09FF826D86}"/>
               </a:ext>
             </a:extLst>
           </p:cNvPr>
@@ -13392,7 +13750,7 @@
           <p:cNvPr id="3" name="Контейнер за съдържание 2">
             <a:extLst>
               <a:ext uri="{FF2B5EF4-FFF2-40B4-BE49-F238E27FC236}">
-                <a16:creationId xmlns:a16="http://schemas.microsoft.com/office/drawing/2014/main" id="{5DB4216B-B894-4FCC-AD84-3B12A915AE3F}"/>
+                <a16:creationId xmlns:a16="http://schemas.microsoft.com/office/drawing/2014/main" xmlns="" id="{5DB4216B-B894-4FCC-AD84-3B12A915AE3F}"/>
               </a:ext>
             </a:extLst>
           </p:cNvPr>
@@ -13447,7 +13805,7 @@
           <p:cNvPr id="2" name="Заглавие 1">
             <a:extLst>
               <a:ext uri="{FF2B5EF4-FFF2-40B4-BE49-F238E27FC236}">
-                <a16:creationId xmlns:a16="http://schemas.microsoft.com/office/drawing/2014/main" id="{1AEEF4D1-75E3-4F28-B558-1DA3C7681BBB}"/>
+                <a16:creationId xmlns:a16="http://schemas.microsoft.com/office/drawing/2014/main" xmlns="" id="{1AEEF4D1-75E3-4F28-B558-1DA3C7681BBB}"/>
               </a:ext>
             </a:extLst>
           </p:cNvPr>
@@ -13475,7 +13833,7 @@
           <p:cNvPr id="3" name="Контейнер за съдържание 2">
             <a:extLst>
               <a:ext uri="{FF2B5EF4-FFF2-40B4-BE49-F238E27FC236}">
-                <a16:creationId xmlns:a16="http://schemas.microsoft.com/office/drawing/2014/main" id="{54D001CB-652B-4A59-982F-228B26525BD6}"/>
+                <a16:creationId xmlns:a16="http://schemas.microsoft.com/office/drawing/2014/main" xmlns="" id="{54D001CB-652B-4A59-982F-228B26525BD6}"/>
               </a:ext>
             </a:extLst>
           </p:cNvPr>
@@ -13530,7 +13888,7 @@
           <p:cNvPr id="2" name="Заглавие 1">
             <a:extLst>
               <a:ext uri="{FF2B5EF4-FFF2-40B4-BE49-F238E27FC236}">
-                <a16:creationId xmlns:a16="http://schemas.microsoft.com/office/drawing/2014/main" id="{22F7CEC7-972D-41C2-9E24-1AB27CAFA21B}"/>
+                <a16:creationId xmlns:a16="http://schemas.microsoft.com/office/drawing/2014/main" xmlns="" id="{22F7CEC7-972D-41C2-9E24-1AB27CAFA21B}"/>
               </a:ext>
             </a:extLst>
           </p:cNvPr>
@@ -13558,7 +13916,7 @@
           <p:cNvPr id="3" name="Контейнер за съдържание 2">
             <a:extLst>
               <a:ext uri="{FF2B5EF4-FFF2-40B4-BE49-F238E27FC236}">
-                <a16:creationId xmlns:a16="http://schemas.microsoft.com/office/drawing/2014/main" id="{A88657AD-63FC-42AF-A66A-72F06B6D4E56}"/>
+                <a16:creationId xmlns:a16="http://schemas.microsoft.com/office/drawing/2014/main" xmlns="" id="{A88657AD-63FC-42AF-A66A-72F06B6D4E56}"/>
               </a:ext>
             </a:extLst>
           </p:cNvPr>
@@ -13613,7 +13971,7 @@
           <p:cNvPr id="2" name="Заглавие 1">
             <a:extLst>
               <a:ext uri="{FF2B5EF4-FFF2-40B4-BE49-F238E27FC236}">
-                <a16:creationId xmlns:a16="http://schemas.microsoft.com/office/drawing/2014/main" id="{8471F509-DAC8-4661-B5C7-1D38B5DE4B94}"/>
+                <a16:creationId xmlns:a16="http://schemas.microsoft.com/office/drawing/2014/main" xmlns="" id="{8471F509-DAC8-4661-B5C7-1D38B5DE4B94}"/>
               </a:ext>
             </a:extLst>
           </p:cNvPr>
@@ -13641,7 +13999,7 @@
           <p:cNvPr id="3" name="Контейнер за съдържание 2">
             <a:extLst>
               <a:ext uri="{FF2B5EF4-FFF2-40B4-BE49-F238E27FC236}">
-                <a16:creationId xmlns:a16="http://schemas.microsoft.com/office/drawing/2014/main" id="{9FC719CA-965C-41CF-9021-3A4378D64CBE}"/>
+                <a16:creationId xmlns:a16="http://schemas.microsoft.com/office/drawing/2014/main" xmlns="" id="{9FC719CA-965C-41CF-9021-3A4378D64CBE}"/>
               </a:ext>
             </a:extLst>
           </p:cNvPr>
@@ -13657,7 +14015,35 @@
           <a:bodyPr/>
           <a:lstStyle/>
           <a:p>
-            <a:endParaRPr lang="en-BZ"/>
+            <a:r>
+              <a:rPr lang="en-BZ" dirty="0" smtClean="0"/>
+              <a:t>Allow the user to place an event (meeting or break) in his agenda.</a:t>
+            </a:r>
+          </a:p>
+          <a:p>
+            <a:r>
+              <a:rPr lang="en-BZ" dirty="0" smtClean="0"/>
+              <a:t>The system must be able to calculate the estimated travel time to reach the meeting.</a:t>
+            </a:r>
+          </a:p>
+          <a:p>
+            <a:r>
+              <a:rPr lang="en-BZ" dirty="0" smtClean="0"/>
+              <a:t>Obtain different routes (at least one) between the events taking into account the travel preferences of the user.</a:t>
+            </a:r>
+          </a:p>
+          <a:p>
+            <a:r>
+              <a:rPr lang="en-BZ" dirty="0" smtClean="0"/>
+              <a:t>Notify the user if there is an event overlap.</a:t>
+            </a:r>
+          </a:p>
+          <a:p>
+            <a:r>
+              <a:rPr lang="en-BZ" dirty="0" smtClean="0"/>
+              <a:t>The system must be able to check the availability of transport methods at a given location.</a:t>
+            </a:r>
+            <a:endParaRPr lang="en-BZ" dirty="0"/>
           </a:p>
         </p:txBody>
       </p:sp>
@@ -13696,7 +14082,7 @@
           <p:cNvPr id="2" name="Заглавие 1">
             <a:extLst>
               <a:ext uri="{FF2B5EF4-FFF2-40B4-BE49-F238E27FC236}">
-                <a16:creationId xmlns:a16="http://schemas.microsoft.com/office/drawing/2014/main" id="{B8304ABE-90B5-4953-BB69-448AF95C73B1}"/>
+                <a16:creationId xmlns:a16="http://schemas.microsoft.com/office/drawing/2014/main" xmlns="" id="{B8304ABE-90B5-4953-BB69-448AF95C73B1}"/>
               </a:ext>
             </a:extLst>
           </p:cNvPr>
@@ -13724,7 +14110,7 @@
           <p:cNvPr id="3" name="Контейнер за съдържание 2">
             <a:extLst>
               <a:ext uri="{FF2B5EF4-FFF2-40B4-BE49-F238E27FC236}">
-                <a16:creationId xmlns:a16="http://schemas.microsoft.com/office/drawing/2014/main" id="{BD5729E4-BD7C-4C43-809F-9A580349D3DB}"/>
+                <a16:creationId xmlns:a16="http://schemas.microsoft.com/office/drawing/2014/main" xmlns="" id="{BD5729E4-BD7C-4C43-809F-9A580349D3DB}"/>
               </a:ext>
             </a:extLst>
           </p:cNvPr>
@@ -13737,10 +14123,42 @@
         </p:nvSpPr>
         <p:spPr/>
         <p:txBody>
-          <a:bodyPr/>
+          <a:bodyPr>
+            <a:normAutofit/>
+          </a:bodyPr>
           <a:lstStyle/>
           <a:p>
-            <a:endParaRPr lang="en-BZ"/>
+            <a:r>
+              <a:rPr lang="en-BZ" sz="2200" dirty="0" smtClean="0"/>
+              <a:t>Constant internet connectivity.</a:t>
+            </a:r>
+          </a:p>
+          <a:p>
+            <a:r>
+              <a:rPr lang="en-BZ" sz="2200" dirty="0" smtClean="0"/>
+              <a:t>Geolocation turn on at all times.</a:t>
+            </a:r>
+          </a:p>
+          <a:p>
+            <a:r>
+              <a:rPr lang="en-BZ" sz="2200" dirty="0" smtClean="0"/>
+              <a:t>User correctly enters meeting </a:t>
+            </a:r>
+            <a:r>
+              <a:rPr lang="en-BZ" sz="2200" dirty="0" err="1" smtClean="0"/>
+              <a:t>adress</a:t>
+            </a:r>
+            <a:r>
+              <a:rPr lang="en-BZ" sz="2200" dirty="0" smtClean="0"/>
+              <a:t>.</a:t>
+            </a:r>
+          </a:p>
+          <a:p>
+            <a:r>
+              <a:rPr lang="en-BZ" sz="2200" dirty="0" smtClean="0"/>
+              <a:t>The phone is synchronized correctly with the current time of the user region via mobile link or manually.</a:t>
+            </a:r>
+            <a:endParaRPr lang="en-BZ" sz="2200" dirty="0"/>
           </a:p>
         </p:txBody>
       </p:sp>
@@ -13754,12 +14172,27 @@
   <p:clrMapOvr>
     <a:masterClrMapping/>
   </p:clrMapOvr>
+  <p:timing>
+    <p:tnLst>
+      <p:par>
+        <p:cTn id="1" dur="indefinite" restart="never" nodeType="tmRoot"/>
+      </p:par>
+    </p:tnLst>
+  </p:timing>
 </p:sld>
 </file>
 
 <file path=ppt/slides/slide7.xml><?xml version="1.0" encoding="utf-8"?>
 <p:sld xmlns:a="http://schemas.openxmlformats.org/drawingml/2006/main" xmlns:r="http://schemas.openxmlformats.org/officeDocument/2006/relationships" xmlns:p="http://schemas.openxmlformats.org/presentationml/2006/main">
   <p:cSld>
+    <p:bg>
+      <p:bgPr>
+        <a:solidFill>
+          <a:schemeClr val="bg1"/>
+        </a:solidFill>
+        <a:effectLst/>
+      </p:bgPr>
+    </p:bg>
     <p:spTree>
       <p:nvGrpSpPr>
         <p:cNvPr id="1" name=""/>
@@ -13774,12 +14207,806 @@
           <a:chExt cx="0" cy="0"/>
         </a:xfrm>
       </p:grpSpPr>
+      <p:grpSp>
+        <p:nvGrpSpPr>
+          <p:cNvPr id="9" name="Group 8">
+            <a:extLst>
+              <a:ext uri="{FF2B5EF4-FFF2-40B4-BE49-F238E27FC236}">
+                <a16:creationId xmlns:a16="http://schemas.microsoft.com/office/drawing/2014/main" xmlns="" id="{427E0A4F-FE1D-4A81-8D8F-986345F71CBE}"/>
+              </a:ext>
+            </a:extLst>
+          </p:cNvPr>
+          <p:cNvGrpSpPr>
+            <a:grpSpLocks noGrp="1" noUngrp="1" noRot="1" noChangeAspect="1" noMove="1" noResize="1"/>
+          </p:cNvGrpSpPr>
+          <p:nvPr>
+            <p:extLst>
+              <p:ext uri="{386F3935-93C4-4BCD-93E2-E3B085C9AB24}">
+                <p16:designElem xmlns:p16="http://schemas.microsoft.com/office/powerpoint/2015/main" val="1"/>
+              </p:ext>
+            </p:extLst>
+          </p:nvPr>
+        </p:nvGrpSpPr>
+        <p:grpSpPr>
+          <a:xfrm>
+            <a:off x="0" y="0"/>
+            <a:ext cx="12192000" cy="6858000"/>
+            <a:chOff x="0" y="0"/>
+            <a:chExt cx="12192000" cy="6858000"/>
+          </a:xfrm>
+        </p:grpSpPr>
+        <p:sp>
+          <p:nvSpPr>
+            <p:cNvPr id="10" name="Rectangle 9">
+              <a:extLst>
+                <a:ext uri="{FF2B5EF4-FFF2-40B4-BE49-F238E27FC236}">
+                  <a16:creationId xmlns:a16="http://schemas.microsoft.com/office/drawing/2014/main" xmlns="" id="{F70C2B8F-6B1B-46D5-86E6-40F36C695FC2}"/>
+                </a:ext>
+              </a:extLst>
+            </p:cNvPr>
+            <p:cNvSpPr/>
+            <p:nvPr>
+              <p:extLst>
+                <p:ext uri="{386F3935-93C4-4BCD-93E2-E3B085C9AB24}">
+                  <p16:designElem xmlns:p16="http://schemas.microsoft.com/office/powerpoint/2015/main" val="1"/>
+                </p:ext>
+              </p:extLst>
+            </p:nvPr>
+          </p:nvSpPr>
+          <p:spPr>
+            <a:xfrm>
+              <a:off x="0" y="0"/>
+              <a:ext cx="12192000" cy="6858000"/>
+            </a:xfrm>
+            <a:prstGeom prst="rect">
+              <a:avLst/>
+            </a:prstGeom>
+            <a:blipFill>
+              <a:blip r:embed="rId2">
+                <a:duotone>
+                  <a:schemeClr val="dk2">
+                    <a:shade val="69000"/>
+                    <a:hueMod val="91000"/>
+                    <a:satMod val="164000"/>
+                    <a:lumMod val="74000"/>
+                  </a:schemeClr>
+                  <a:schemeClr val="dk2">
+                    <a:hueMod val="124000"/>
+                    <a:satMod val="140000"/>
+                    <a:lumMod val="142000"/>
+                  </a:schemeClr>
+                </a:duotone>
+              </a:blip>
+              <a:stretch>
+                <a:fillRect/>
+              </a:stretch>
+            </a:blipFill>
+            <a:ln>
+              <a:noFill/>
+            </a:ln>
+          </p:spPr>
+          <p:style>
+            <a:lnRef idx="2">
+              <a:schemeClr val="accent1">
+                <a:shade val="50000"/>
+              </a:schemeClr>
+            </a:lnRef>
+            <a:fillRef idx="1">
+              <a:schemeClr val="accent1"/>
+            </a:fillRef>
+            <a:effectRef idx="0">
+              <a:schemeClr val="accent1"/>
+            </a:effectRef>
+            <a:fontRef idx="minor">
+              <a:schemeClr val="lt1"/>
+            </a:fontRef>
+          </p:style>
+        </p:sp>
+        <p:sp>
+          <p:nvSpPr>
+            <p:cNvPr id="11" name="Oval 10">
+              <a:extLst>
+                <a:ext uri="{FF2B5EF4-FFF2-40B4-BE49-F238E27FC236}">
+                  <a16:creationId xmlns:a16="http://schemas.microsoft.com/office/drawing/2014/main" xmlns="" id="{77B237C1-E8A0-4DD3-B6C5-F2D54F796F82}"/>
+                </a:ext>
+              </a:extLst>
+            </p:cNvPr>
+            <p:cNvSpPr/>
+            <p:nvPr>
+              <p:extLst>
+                <p:ext uri="{386F3935-93C4-4BCD-93E2-E3B085C9AB24}">
+                  <p16:designElem xmlns:p16="http://schemas.microsoft.com/office/powerpoint/2015/main" val="1"/>
+                </p:ext>
+              </p:extLst>
+            </p:nvPr>
+          </p:nvSpPr>
+          <p:spPr>
+            <a:xfrm>
+              <a:off x="0" y="2667000"/>
+              <a:ext cx="4191000" cy="4191000"/>
+            </a:xfrm>
+            <a:prstGeom prst="ellipse">
+              <a:avLst/>
+            </a:prstGeom>
+            <a:gradFill flip="none" rotWithShape="1">
+              <a:gsLst>
+                <a:gs pos="0">
+                  <a:schemeClr val="accent5">
+                    <a:alpha val="11000"/>
+                  </a:schemeClr>
+                </a:gs>
+                <a:gs pos="75000">
+                  <a:schemeClr val="accent5">
+                    <a:alpha val="0"/>
+                  </a:schemeClr>
+                </a:gs>
+                <a:gs pos="36000">
+                  <a:schemeClr val="accent5">
+                    <a:alpha val="10000"/>
+                  </a:schemeClr>
+                </a:gs>
+              </a:gsLst>
+              <a:path path="circle">
+                <a:fillToRect l="50000" t="50000" r="50000" b="50000"/>
+              </a:path>
+              <a:tileRect/>
+            </a:gradFill>
+            <a:ln>
+              <a:noFill/>
+            </a:ln>
+            <a:effectLst/>
+          </p:spPr>
+          <p:style>
+            <a:lnRef idx="1">
+              <a:schemeClr val="accent1"/>
+            </a:lnRef>
+            <a:fillRef idx="3">
+              <a:schemeClr val="accent1"/>
+            </a:fillRef>
+            <a:effectRef idx="2">
+              <a:schemeClr val="accent1"/>
+            </a:effectRef>
+            <a:fontRef idx="minor">
+              <a:schemeClr val="lt1"/>
+            </a:fontRef>
+          </p:style>
+        </p:sp>
+        <p:sp>
+          <p:nvSpPr>
+            <p:cNvPr id="12" name="Oval 11">
+              <a:extLst>
+                <a:ext uri="{FF2B5EF4-FFF2-40B4-BE49-F238E27FC236}">
+                  <a16:creationId xmlns:a16="http://schemas.microsoft.com/office/drawing/2014/main" xmlns="" id="{88D62F0D-6BD4-4DD4-B125-6F7A952A3122}"/>
+                </a:ext>
+              </a:extLst>
+            </p:cNvPr>
+            <p:cNvSpPr/>
+            <p:nvPr>
+              <p:extLst>
+                <p:ext uri="{386F3935-93C4-4BCD-93E2-E3B085C9AB24}">
+                  <p16:designElem xmlns:p16="http://schemas.microsoft.com/office/powerpoint/2015/main" val="1"/>
+                </p:ext>
+              </p:extLst>
+            </p:nvPr>
+          </p:nvSpPr>
+          <p:spPr>
+            <a:xfrm>
+              <a:off x="0" y="2895600"/>
+              <a:ext cx="2362200" cy="2362200"/>
+            </a:xfrm>
+            <a:prstGeom prst="ellipse">
+              <a:avLst/>
+            </a:prstGeom>
+            <a:gradFill flip="none" rotWithShape="1">
+              <a:gsLst>
+                <a:gs pos="0">
+                  <a:schemeClr val="accent5">
+                    <a:alpha val="8000"/>
+                  </a:schemeClr>
+                </a:gs>
+                <a:gs pos="72000">
+                  <a:schemeClr val="accent5">
+                    <a:alpha val="0"/>
+                  </a:schemeClr>
+                </a:gs>
+                <a:gs pos="36000">
+                  <a:schemeClr val="accent5">
+                    <a:alpha val="8000"/>
+                  </a:schemeClr>
+                </a:gs>
+              </a:gsLst>
+              <a:path path="circle">
+                <a:fillToRect l="50000" t="50000" r="50000" b="50000"/>
+              </a:path>
+              <a:tileRect/>
+            </a:gradFill>
+            <a:ln>
+              <a:noFill/>
+            </a:ln>
+            <a:effectLst/>
+          </p:spPr>
+          <p:style>
+            <a:lnRef idx="1">
+              <a:schemeClr val="accent1"/>
+            </a:lnRef>
+            <a:fillRef idx="3">
+              <a:schemeClr val="accent1"/>
+            </a:fillRef>
+            <a:effectRef idx="2">
+              <a:schemeClr val="accent1"/>
+            </a:effectRef>
+            <a:fontRef idx="minor">
+              <a:schemeClr val="lt1"/>
+            </a:fontRef>
+          </p:style>
+        </p:sp>
+        <p:sp>
+          <p:nvSpPr>
+            <p:cNvPr id="13" name="Rectangle 12">
+              <a:extLst>
+                <a:ext uri="{FF2B5EF4-FFF2-40B4-BE49-F238E27FC236}">
+                  <a16:creationId xmlns:a16="http://schemas.microsoft.com/office/drawing/2014/main" xmlns="" id="{F928E8CD-5219-4795-91D4-9618DB8ED6C1}"/>
+                </a:ext>
+              </a:extLst>
+            </p:cNvPr>
+            <p:cNvSpPr/>
+            <p:nvPr>
+              <p:extLst>
+                <p:ext uri="{386F3935-93C4-4BCD-93E2-E3B085C9AB24}">
+                  <p16:designElem xmlns:p16="http://schemas.microsoft.com/office/powerpoint/2015/main" val="1"/>
+                </p:ext>
+              </p:extLst>
+            </p:nvPr>
+          </p:nvSpPr>
+          <p:spPr bwMode="gray">
+            <a:xfrm>
+              <a:off x="6700828" y="402165"/>
+              <a:ext cx="5067838" cy="6053670"/>
+            </a:xfrm>
+            <a:prstGeom prst="rect">
+              <a:avLst/>
+            </a:prstGeom>
+            <a:solidFill>
+              <a:schemeClr val="bg1"/>
+            </a:solidFill>
+            <a:ln>
+              <a:noFill/>
+            </a:ln>
+            <a:effectLst/>
+          </p:spPr>
+          <p:style>
+            <a:lnRef idx="1">
+              <a:schemeClr val="accent1"/>
+            </a:lnRef>
+            <a:fillRef idx="3">
+              <a:schemeClr val="accent1"/>
+            </a:fillRef>
+            <a:effectRef idx="2">
+              <a:schemeClr val="accent1"/>
+            </a:effectRef>
+            <a:fontRef idx="minor">
+              <a:schemeClr val="lt1"/>
+            </a:fontRef>
+          </p:style>
+        </p:sp>
+        <p:sp>
+          <p:nvSpPr>
+            <p:cNvPr id="14" name="Freeform 5">
+              <a:extLst>
+                <a:ext uri="{FF2B5EF4-FFF2-40B4-BE49-F238E27FC236}">
+                  <a16:creationId xmlns:a16="http://schemas.microsoft.com/office/drawing/2014/main" xmlns="" id="{A00A43E1-4FE7-498F-AFFF-FDFC1FAF04AD}"/>
+                </a:ext>
+              </a:extLst>
+            </p:cNvPr>
+            <p:cNvSpPr/>
+            <p:nvPr>
+              <p:extLst>
+                <p:ext uri="{386F3935-93C4-4BCD-93E2-E3B085C9AB24}">
+                  <p16:designElem xmlns:p16="http://schemas.microsoft.com/office/powerpoint/2015/main" val="1"/>
+                </p:ext>
+              </p:extLst>
+            </p:nvPr>
+          </p:nvSpPr>
+          <p:spPr bwMode="gray">
+            <a:xfrm rot="16200000">
+              <a:off x="3787244" y="2801721"/>
+              <a:ext cx="6053670" cy="1254558"/>
+            </a:xfrm>
+            <a:custGeom>
+              <a:avLst/>
+              <a:gdLst/>
+              <a:ahLst/>
+              <a:cxnLst/>
+              <a:rect l="l" t="t" r="r" b="b"/>
+              <a:pathLst>
+                <a:path w="10000" h="8000">
+                  <a:moveTo>
+                    <a:pt x="0" y="0"/>
+                  </a:moveTo>
+                  <a:lnTo>
+                    <a:pt x="0" y="7970"/>
+                  </a:lnTo>
+                  <a:lnTo>
+                    <a:pt x="10000" y="8000"/>
+                  </a:lnTo>
+                  <a:lnTo>
+                    <a:pt x="10000" y="7"/>
+                  </a:lnTo>
+                  <a:lnTo>
+                    <a:pt x="10000" y="7"/>
+                  </a:lnTo>
+                  <a:lnTo>
+                    <a:pt x="9773" y="156"/>
+                  </a:lnTo>
+                  <a:lnTo>
+                    <a:pt x="9547" y="298"/>
+                  </a:lnTo>
+                  <a:lnTo>
+                    <a:pt x="9320" y="437"/>
+                  </a:lnTo>
+                  <a:lnTo>
+                    <a:pt x="9092" y="556"/>
+                  </a:lnTo>
+                  <a:lnTo>
+                    <a:pt x="8865" y="676"/>
+                  </a:lnTo>
+                  <a:lnTo>
+                    <a:pt x="8637" y="788"/>
+                  </a:lnTo>
+                  <a:lnTo>
+                    <a:pt x="8412" y="884"/>
+                  </a:lnTo>
+                  <a:lnTo>
+                    <a:pt x="8184" y="975"/>
+                  </a:lnTo>
+                  <a:lnTo>
+                    <a:pt x="7957" y="1058"/>
+                  </a:lnTo>
+                  <a:lnTo>
+                    <a:pt x="7734" y="1130"/>
+                  </a:lnTo>
+                  <a:lnTo>
+                    <a:pt x="7508" y="1202"/>
+                  </a:lnTo>
+                  <a:lnTo>
+                    <a:pt x="7285" y="1262"/>
+                  </a:lnTo>
+                  <a:lnTo>
+                    <a:pt x="7062" y="1309"/>
+                  </a:lnTo>
+                  <a:lnTo>
+                    <a:pt x="6840" y="1358"/>
+                  </a:lnTo>
+                  <a:lnTo>
+                    <a:pt x="6620" y="1399"/>
+                  </a:lnTo>
+                  <a:lnTo>
+                    <a:pt x="6402" y="1428"/>
+                  </a:lnTo>
+                  <a:lnTo>
+                    <a:pt x="6184" y="1453"/>
+                  </a:lnTo>
+                  <a:lnTo>
+                    <a:pt x="5968" y="1477"/>
+                  </a:lnTo>
+                  <a:lnTo>
+                    <a:pt x="5755" y="1488"/>
+                  </a:lnTo>
+                  <a:lnTo>
+                    <a:pt x="5542" y="1500"/>
+                  </a:lnTo>
+                  <a:lnTo>
+                    <a:pt x="5332" y="1506"/>
+                  </a:lnTo>
+                  <a:lnTo>
+                    <a:pt x="5124" y="1500"/>
+                  </a:lnTo>
+                  <a:lnTo>
+                    <a:pt x="4918" y="1500"/>
+                  </a:lnTo>
+                  <a:lnTo>
+                    <a:pt x="4714" y="1488"/>
+                  </a:lnTo>
+                  <a:lnTo>
+                    <a:pt x="4514" y="1470"/>
+                  </a:lnTo>
+                  <a:lnTo>
+                    <a:pt x="4316" y="1453"/>
+                  </a:lnTo>
+                  <a:lnTo>
+                    <a:pt x="4122" y="1434"/>
+                  </a:lnTo>
+                  <a:lnTo>
+                    <a:pt x="3929" y="1405"/>
+                  </a:lnTo>
+                  <a:lnTo>
+                    <a:pt x="3739" y="1374"/>
+                  </a:lnTo>
+                  <a:lnTo>
+                    <a:pt x="3553" y="1346"/>
+                  </a:lnTo>
+                  <a:lnTo>
+                    <a:pt x="3190" y="1267"/>
+                  </a:lnTo>
+                  <a:lnTo>
+                    <a:pt x="2842" y="1183"/>
+                  </a:lnTo>
+                  <a:lnTo>
+                    <a:pt x="2508" y="1095"/>
+                  </a:lnTo>
+                  <a:lnTo>
+                    <a:pt x="2192" y="998"/>
+                  </a:lnTo>
+                  <a:lnTo>
+                    <a:pt x="1890" y="897"/>
+                  </a:lnTo>
+                  <a:lnTo>
+                    <a:pt x="1610" y="788"/>
+                  </a:lnTo>
+                  <a:lnTo>
+                    <a:pt x="1347" y="681"/>
+                  </a:lnTo>
+                  <a:lnTo>
+                    <a:pt x="1105" y="574"/>
+                  </a:lnTo>
+                  <a:lnTo>
+                    <a:pt x="883" y="473"/>
+                  </a:lnTo>
+                  <a:lnTo>
+                    <a:pt x="686" y="377"/>
+                  </a:lnTo>
+                  <a:lnTo>
+                    <a:pt x="508" y="286"/>
+                  </a:lnTo>
+                  <a:lnTo>
+                    <a:pt x="358" y="210"/>
+                  </a:lnTo>
+                  <a:lnTo>
+                    <a:pt x="232" y="138"/>
+                  </a:lnTo>
+                  <a:lnTo>
+                    <a:pt x="59" y="35"/>
+                  </a:lnTo>
+                  <a:lnTo>
+                    <a:pt x="0" y="0"/>
+                  </a:lnTo>
+                  <a:lnTo>
+                    <a:pt x="0" y="0"/>
+                  </a:lnTo>
+                  <a:close/>
+                </a:path>
+              </a:pathLst>
+            </a:custGeom>
+            <a:solidFill>
+              <a:schemeClr val="bg1"/>
+            </a:solidFill>
+            <a:ln>
+              <a:noFill/>
+            </a:ln>
+          </p:spPr>
+        </p:sp>
+        <p:sp>
+          <p:nvSpPr>
+            <p:cNvPr id="15" name="Freeform 5">
+              <a:extLst>
+                <a:ext uri="{FF2B5EF4-FFF2-40B4-BE49-F238E27FC236}">
+                  <a16:creationId xmlns:a16="http://schemas.microsoft.com/office/drawing/2014/main" xmlns="" id="{DB521824-592C-476A-AB0A-CA0C6D1F3407}"/>
+                </a:ext>
+              </a:extLst>
+            </p:cNvPr>
+            <p:cNvSpPr/>
+            <p:nvPr>
+              <p:extLst>
+                <p:ext uri="{386F3935-93C4-4BCD-93E2-E3B085C9AB24}">
+                  <p16:designElem xmlns:p16="http://schemas.microsoft.com/office/powerpoint/2015/main" val="1"/>
+                </p:ext>
+              </p:extLst>
+            </p:nvPr>
+          </p:nvSpPr>
+          <p:spPr bwMode="gray">
+            <a:xfrm rot="15922489">
+              <a:off x="4698352" y="1826078"/>
+              <a:ext cx="3299407" cy="440924"/>
+            </a:xfrm>
+            <a:custGeom>
+              <a:avLst/>
+              <a:gdLst/>
+              <a:ahLst/>
+              <a:cxnLst/>
+              <a:rect l="l" t="t" r="r" b="b"/>
+              <a:pathLst>
+                <a:path w="10000" h="5291">
+                  <a:moveTo>
+                    <a:pt x="85" y="2532"/>
+                  </a:moveTo>
+                  <a:cubicBezTo>
+                    <a:pt x="1736" y="3911"/>
+                    <a:pt x="7524" y="5298"/>
+                    <a:pt x="9958" y="5291"/>
+                  </a:cubicBezTo>
+                  <a:cubicBezTo>
+                    <a:pt x="9989" y="1958"/>
+                    <a:pt x="9969" y="3333"/>
+                    <a:pt x="10000" y="0"/>
+                  </a:cubicBezTo>
+                  <a:lnTo>
+                    <a:pt x="10000" y="0"/>
+                  </a:lnTo>
+                  <a:lnTo>
+                    <a:pt x="9667" y="204"/>
+                  </a:lnTo>
+                  <a:lnTo>
+                    <a:pt x="9334" y="400"/>
+                  </a:lnTo>
+                  <a:lnTo>
+                    <a:pt x="9001" y="590"/>
+                  </a:lnTo>
+                  <a:lnTo>
+                    <a:pt x="8667" y="753"/>
+                  </a:lnTo>
+                  <a:lnTo>
+                    <a:pt x="8333" y="917"/>
+                  </a:lnTo>
+                  <a:lnTo>
+                    <a:pt x="7999" y="1071"/>
+                  </a:lnTo>
+                  <a:lnTo>
+                    <a:pt x="7669" y="1202"/>
+                  </a:lnTo>
+                  <a:lnTo>
+                    <a:pt x="7333" y="1325"/>
+                  </a:lnTo>
+                  <a:lnTo>
+                    <a:pt x="7000" y="1440"/>
+                  </a:lnTo>
+                  <a:lnTo>
+                    <a:pt x="6673" y="1538"/>
+                  </a:lnTo>
+                  <a:lnTo>
+                    <a:pt x="6340" y="1636"/>
+                  </a:lnTo>
+                  <a:lnTo>
+                    <a:pt x="6013" y="1719"/>
+                  </a:lnTo>
+                  <a:lnTo>
+                    <a:pt x="5686" y="1784"/>
+                  </a:lnTo>
+                  <a:lnTo>
+                    <a:pt x="5359" y="1850"/>
+                  </a:lnTo>
+                  <a:lnTo>
+                    <a:pt x="5036" y="1906"/>
+                  </a:lnTo>
+                  <a:lnTo>
+                    <a:pt x="4717" y="1948"/>
+                  </a:lnTo>
+                  <a:lnTo>
+                    <a:pt x="4396" y="1980"/>
+                  </a:lnTo>
+                  <a:lnTo>
+                    <a:pt x="4079" y="2013"/>
+                  </a:lnTo>
+                  <a:lnTo>
+                    <a:pt x="3766" y="2029"/>
+                  </a:lnTo>
+                  <a:lnTo>
+                    <a:pt x="3454" y="2046"/>
+                  </a:lnTo>
+                  <a:lnTo>
+                    <a:pt x="3145" y="2053"/>
+                  </a:lnTo>
+                  <a:lnTo>
+                    <a:pt x="2839" y="2046"/>
+                  </a:lnTo>
+                  <a:lnTo>
+                    <a:pt x="2537" y="2046"/>
+                  </a:lnTo>
+                  <a:lnTo>
+                    <a:pt x="2238" y="2029"/>
+                  </a:lnTo>
+                  <a:lnTo>
+                    <a:pt x="1943" y="2004"/>
+                  </a:lnTo>
+                  <a:lnTo>
+                    <a:pt x="1653" y="1980"/>
+                  </a:lnTo>
+                  <a:lnTo>
+                    <a:pt x="1368" y="1955"/>
+                  </a:lnTo>
+                  <a:lnTo>
+                    <a:pt x="1085" y="1915"/>
+                  </a:lnTo>
+                  <a:lnTo>
+                    <a:pt x="806" y="1873"/>
+                  </a:lnTo>
+                  <a:lnTo>
+                    <a:pt x="533" y="1833"/>
+                  </a:lnTo>
+                  <a:lnTo>
+                    <a:pt x="0" y="1726"/>
+                  </a:lnTo>
+                  <a:cubicBezTo>
+                    <a:pt x="28" y="1995"/>
+                    <a:pt x="57" y="2263"/>
+                    <a:pt x="85" y="2532"/>
+                  </a:cubicBezTo>
+                  <a:close/>
+                </a:path>
+              </a:pathLst>
+            </a:custGeom>
+            <a:solidFill>
+              <a:schemeClr val="bg1">
+                <a:alpha val="20000"/>
+              </a:schemeClr>
+            </a:solidFill>
+            <a:ln>
+              <a:noFill/>
+            </a:ln>
+          </p:spPr>
+        </p:sp>
+        <p:sp>
+          <p:nvSpPr>
+            <p:cNvPr id="16" name="Freeform 5">
+              <a:extLst>
+                <a:ext uri="{FF2B5EF4-FFF2-40B4-BE49-F238E27FC236}">
+                  <a16:creationId xmlns:a16="http://schemas.microsoft.com/office/drawing/2014/main" xmlns="" id="{B5C860C9-D4F9-4350-80DA-0D1CD36C7741}"/>
+                </a:ext>
+              </a:extLst>
+            </p:cNvPr>
+            <p:cNvSpPr>
+              <a:spLocks noEditPoints="1"/>
+            </p:cNvSpPr>
+            <p:nvPr>
+              <p:extLst>
+                <p:ext uri="{386F3935-93C4-4BCD-93E2-E3B085C9AB24}">
+                  <p16:designElem xmlns:p16="http://schemas.microsoft.com/office/powerpoint/2015/main" val="1"/>
+                </p:ext>
+              </p:extLst>
+            </p:nvPr>
+          </p:nvSpPr>
+          <p:spPr bwMode="gray">
+            <a:xfrm>
+              <a:off x="0" y="1587"/>
+              <a:ext cx="12192000" cy="6856413"/>
+            </a:xfrm>
+            <a:custGeom>
+              <a:avLst/>
+              <a:gdLst/>
+              <a:ahLst/>
+              <a:cxnLst/>
+              <a:rect l="0" t="0" r="r" b="b"/>
+              <a:pathLst>
+                <a:path w="15356" h="8638">
+                  <a:moveTo>
+                    <a:pt x="0" y="0"/>
+                  </a:moveTo>
+                  <a:lnTo>
+                    <a:pt x="0" y="8638"/>
+                  </a:lnTo>
+                  <a:lnTo>
+                    <a:pt x="15356" y="8638"/>
+                  </a:lnTo>
+                  <a:lnTo>
+                    <a:pt x="15356" y="0"/>
+                  </a:lnTo>
+                  <a:lnTo>
+                    <a:pt x="0" y="0"/>
+                  </a:lnTo>
+                  <a:close/>
+                  <a:moveTo>
+                    <a:pt x="14748" y="8038"/>
+                  </a:moveTo>
+                  <a:lnTo>
+                    <a:pt x="600" y="8038"/>
+                  </a:lnTo>
+                  <a:lnTo>
+                    <a:pt x="600" y="592"/>
+                  </a:lnTo>
+                  <a:lnTo>
+                    <a:pt x="14748" y="592"/>
+                  </a:lnTo>
+                  <a:lnTo>
+                    <a:pt x="14748" y="8038"/>
+                  </a:lnTo>
+                  <a:close/>
+                </a:path>
+              </a:pathLst>
+            </a:custGeom>
+            <a:solidFill>
+              <a:schemeClr val="bg1"/>
+            </a:solidFill>
+            <a:ln>
+              <a:noFill/>
+            </a:ln>
+          </p:spPr>
+        </p:sp>
+      </p:grpSp>
+      <p:pic>
+        <p:nvPicPr>
+          <p:cNvPr id="4" name="Imagen 3"/>
+          <p:cNvPicPr>
+            <a:picLocks noChangeAspect="1"/>
+          </p:cNvPicPr>
+          <p:nvPr/>
+        </p:nvPicPr>
+        <p:blipFill>
+          <a:blip r:embed="rId3">
+            <a:extLst>
+              <a:ext uri="{28A0092B-C50C-407E-A947-70E740481C1C}">
+                <a14:useLocalDpi xmlns:a14="http://schemas.microsoft.com/office/drawing/2010/main" val="0"/>
+              </a:ext>
+            </a:extLst>
+          </a:blip>
+          <a:stretch>
+            <a:fillRect/>
+          </a:stretch>
+        </p:blipFill>
+        <p:spPr>
+          <a:xfrm>
+            <a:off x="7097512" y="645106"/>
+            <a:ext cx="4063355" cy="5585369"/>
+          </a:xfrm>
+          <a:prstGeom prst="rect">
+            <a:avLst/>
+          </a:prstGeom>
+        </p:spPr>
+      </p:pic>
+      <p:sp>
+        <p:nvSpPr>
+          <p:cNvPr id="18" name="Rectangle 17">
+            <a:extLst>
+              <a:ext uri="{FF2B5EF4-FFF2-40B4-BE49-F238E27FC236}">
+                <a16:creationId xmlns:a16="http://schemas.microsoft.com/office/drawing/2014/main" xmlns="" id="{538A90C8-AE0E-4EBA-9AF8-EEDB206020E0}"/>
+              </a:ext>
+            </a:extLst>
+          </p:cNvPr>
+          <p:cNvSpPr>
+            <a:spLocks noGrp="1" noRot="1" noChangeAspect="1" noMove="1" noResize="1" noEditPoints="1" noAdjustHandles="1" noChangeArrowheads="1" noChangeShapeType="1" noTextEdit="1"/>
+          </p:cNvSpPr>
+          <p:nvPr>
+            <p:extLst>
+              <p:ext uri="{386F3935-93C4-4BCD-93E2-E3B085C9AB24}">
+                <p16:designElem xmlns:p16="http://schemas.microsoft.com/office/powerpoint/2015/main" val="1"/>
+              </p:ext>
+            </p:extLst>
+          </p:nvPr>
+        </p:nvSpPr>
+        <p:spPr>
+          <a:xfrm>
+            <a:off x="10437812" y="0"/>
+            <a:ext cx="685800" cy="1143000"/>
+          </a:xfrm>
+          <a:prstGeom prst="rect">
+            <a:avLst/>
+          </a:prstGeom>
+          <a:solidFill>
+            <a:schemeClr val="accent1"/>
+          </a:solidFill>
+          <a:ln>
+            <a:noFill/>
+          </a:ln>
+        </p:spPr>
+        <p:style>
+          <a:lnRef idx="1">
+            <a:schemeClr val="accent1"/>
+          </a:lnRef>
+          <a:fillRef idx="3">
+            <a:schemeClr val="accent1"/>
+          </a:fillRef>
+          <a:effectRef idx="2">
+            <a:schemeClr val="accent1"/>
+          </a:effectRef>
+          <a:fontRef idx="minor">
+            <a:schemeClr val="lt1"/>
+          </a:fontRef>
+        </p:style>
+      </p:sp>
       <p:sp>
         <p:nvSpPr>
           <p:cNvPr id="2" name="Заглавие 1">
             <a:extLst>
               <a:ext uri="{FF2B5EF4-FFF2-40B4-BE49-F238E27FC236}">
-                <a16:creationId xmlns:a16="http://schemas.microsoft.com/office/drawing/2014/main" id="{35B96CFD-5CBA-42B5-A152-CEC6D2C2A45F}"/>
+                <a16:creationId xmlns:a16="http://schemas.microsoft.com/office/drawing/2014/main" xmlns="" id="{35B96CFD-5CBA-42B5-A152-CEC6D2C2A45F}"/>
               </a:ext>
             </a:extLst>
           </p:cNvPr>
@@ -13790,13 +15017,29 @@
             <p:ph type="title"/>
           </p:nvPr>
         </p:nvSpPr>
-        <p:spPr/>
+        <p:spPr>
+          <a:xfrm>
+            <a:off x="639098" y="629265"/>
+            <a:ext cx="5132438" cy="1622322"/>
+          </a:xfrm>
+        </p:spPr>
         <p:txBody>
-          <a:bodyPr/>
+          <a:bodyPr>
+            <a:normAutofit/>
+          </a:bodyPr>
           <a:lstStyle/>
           <a:p>
+            <a:pPr>
+              <a:lnSpc>
+                <a:spcPct val="90000"/>
+              </a:lnSpc>
+            </a:pPr>
             <a:r>
-              <a:rPr lang="en-BZ" dirty="0"/>
+              <a:rPr lang="en-BZ" sz="3100">
+                <a:solidFill>
+                  <a:srgbClr val="EBEBEB"/>
+                </a:solidFill>
+              </a:rPr>
               <a:t>What do you aim to analyse and prove through the Alloy model?</a:t>
             </a:r>
           </a:p>
@@ -13807,7 +15050,7 @@
           <p:cNvPr id="3" name="Контейнер за съдържание 2">
             <a:extLst>
               <a:ext uri="{FF2B5EF4-FFF2-40B4-BE49-F238E27FC236}">
-                <a16:creationId xmlns:a16="http://schemas.microsoft.com/office/drawing/2014/main" id="{1B85A293-E065-4E30-B54B-2AB9224901F2}"/>
+                <a16:creationId xmlns:a16="http://schemas.microsoft.com/office/drawing/2014/main" xmlns="" id="{1B85A293-E065-4E30-B54B-2AB9224901F2}"/>
               </a:ext>
             </a:extLst>
           </p:cNvPr>
@@ -13818,25 +15061,46 @@
             <p:ph idx="1"/>
           </p:nvPr>
         </p:nvSpPr>
-        <p:spPr/>
+        <p:spPr>
+          <a:xfrm>
+            <a:off x="639098" y="2418735"/>
+            <a:ext cx="5132439" cy="3811742"/>
+          </a:xfrm>
+        </p:spPr>
         <p:txBody>
-          <a:bodyPr/>
+          <a:bodyPr anchor="ctr">
+            <a:normAutofit/>
+          </a:bodyPr>
           <a:lstStyle/>
           <a:p>
-            <a:endParaRPr lang="en-BZ"/>
+            <a:r>
+              <a:rPr lang="en-BZ">
+                <a:solidFill>
+                  <a:srgbClr val="FFFFFF"/>
+                </a:solidFill>
+              </a:rPr>
+              <a:t>We tried to verify that events(meetings and breaks) are created without overlapping and that they can also be deleted.</a:t>
+            </a:r>
           </a:p>
         </p:txBody>
       </p:sp>
     </p:spTree>
     <p:extLst>
       <p:ext uri="{BB962C8B-B14F-4D97-AF65-F5344CB8AC3E}">
-        <p14:creationId xmlns:p14="http://schemas.microsoft.com/office/powerpoint/2010/main" val="2383368399"/>
+        <p14:creationId xmlns:p14="http://schemas.microsoft.com/office/powerpoint/2010/main" val="4590327"/>
       </p:ext>
     </p:extLst>
   </p:cSld>
   <p:clrMapOvr>
     <a:masterClrMapping/>
   </p:clrMapOvr>
+  <p:timing>
+    <p:tnLst>
+      <p:par>
+        <p:cTn id="1" dur="indefinite" restart="never" nodeType="tmRoot"/>
+      </p:par>
+    </p:tnLst>
+  </p:timing>
 </p:sld>
 </file>
 
@@ -14102,4 +15366,265 @@
     </a:ext>
   </a:extLst>
 </a:theme>
+</file>
+
+<file path=ppt/theme/theme2.xml><?xml version="1.0" encoding="utf-8"?>
+<a:theme xmlns:a="http://schemas.openxmlformats.org/drawingml/2006/main" name="Tema de Office">
+  <a:themeElements>
+    <a:clrScheme name="Office">
+      <a:dk1>
+        <a:sysClr val="windowText" lastClr="000000"/>
+      </a:dk1>
+      <a:lt1>
+        <a:sysClr val="window" lastClr="FFFFFF"/>
+      </a:lt1>
+      <a:dk2>
+        <a:srgbClr val="44546A"/>
+      </a:dk2>
+      <a:lt2>
+        <a:srgbClr val="E7E6E6"/>
+      </a:lt2>
+      <a:accent1>
+        <a:srgbClr val="4472C4"/>
+      </a:accent1>
+      <a:accent2>
+        <a:srgbClr val="ED7D31"/>
+      </a:accent2>
+      <a:accent3>
+        <a:srgbClr val="A5A5A5"/>
+      </a:accent3>
+      <a:accent4>
+        <a:srgbClr val="FFC000"/>
+      </a:accent4>
+      <a:accent5>
+        <a:srgbClr val="5B9BD5"/>
+      </a:accent5>
+      <a:accent6>
+        <a:srgbClr val="70AD47"/>
+      </a:accent6>
+      <a:hlink>
+        <a:srgbClr val="0563C1"/>
+      </a:hlink>
+      <a:folHlink>
+        <a:srgbClr val="954F72"/>
+      </a:folHlink>
+    </a:clrScheme>
+    <a:fontScheme name="Office">
+      <a:majorFont>
+        <a:latin typeface="Calibri Light" panose="020F0302020204030204"/>
+        <a:ea typeface=""/>
+        <a:cs typeface=""/>
+        <a:font script="Jpan" typeface="Yu Gothic Light"/>
+        <a:font script="Hang" typeface="맑은 고딕"/>
+        <a:font script="Hans" typeface="DengXian Light"/>
+        <a:font script="Hant" typeface="新細明體"/>
+        <a:font script="Arab" typeface="Times New Roman"/>
+        <a:font script="Hebr" typeface="Times New Roman"/>
+        <a:font script="Thai" typeface="Angsana New"/>
+        <a:font script="Ethi" typeface="Nyala"/>
+        <a:font script="Beng" typeface="Vrinda"/>
+        <a:font script="Gujr" typeface="Shruti"/>
+        <a:font script="Khmr" typeface="MoolBoran"/>
+        <a:font script="Knda" typeface="Tunga"/>
+        <a:font script="Guru" typeface="Raavi"/>
+        <a:font script="Cans" typeface="Euphemia"/>
+        <a:font script="Cher" typeface="Plantagenet Cherokee"/>
+        <a:font script="Yiii" typeface="Microsoft Yi Baiti"/>
+        <a:font script="Tibt" typeface="Microsoft Himalaya"/>
+        <a:font script="Thaa" typeface="MV Boli"/>
+        <a:font script="Deva" typeface="Mangal"/>
+        <a:font script="Telu" typeface="Gautami"/>
+        <a:font script="Taml" typeface="Latha"/>
+        <a:font script="Syrc" typeface="Estrangelo Edessa"/>
+        <a:font script="Orya" typeface="Kalinga"/>
+        <a:font script="Mlym" typeface="Kartika"/>
+        <a:font script="Laoo" typeface="DokChampa"/>
+        <a:font script="Sinh" typeface="Iskoola Pota"/>
+        <a:font script="Mong" typeface="Mongolian Baiti"/>
+        <a:font script="Viet" typeface="Times New Roman"/>
+        <a:font script="Uigh" typeface="Microsoft Uighur"/>
+        <a:font script="Geor" typeface="Sylfaen"/>
+      </a:majorFont>
+      <a:minorFont>
+        <a:latin typeface="Calibri" panose="020F0502020204030204"/>
+        <a:ea typeface=""/>
+        <a:cs typeface=""/>
+        <a:font script="Jpan" typeface="Yu Gothic"/>
+        <a:font script="Hang" typeface="맑은 고딕"/>
+        <a:font script="Hans" typeface="DengXian"/>
+        <a:font script="Hant" typeface="新細明體"/>
+        <a:font script="Arab" typeface="Arial"/>
+        <a:font script="Hebr" typeface="Arial"/>
+        <a:font script="Thai" typeface="Cordia New"/>
+        <a:font script="Ethi" typeface="Nyala"/>
+        <a:font script="Beng" typeface="Vrinda"/>
+        <a:font script="Gujr" typeface="Shruti"/>
+        <a:font script="Khmr" typeface="DaunPenh"/>
+        <a:font script="Knda" typeface="Tunga"/>
+        <a:font script="Guru" typeface="Raavi"/>
+        <a:font script="Cans" typeface="Euphemia"/>
+        <a:font script="Cher" typeface="Plantagenet Cherokee"/>
+        <a:font script="Yiii" typeface="Microsoft Yi Baiti"/>
+        <a:font script="Tibt" typeface="Microsoft Himalaya"/>
+        <a:font script="Thaa" typeface="MV Boli"/>
+        <a:font script="Deva" typeface="Mangal"/>
+        <a:font script="Telu" typeface="Gautami"/>
+        <a:font script="Taml" typeface="Latha"/>
+        <a:font script="Syrc" typeface="Estrangelo Edessa"/>
+        <a:font script="Orya" typeface="Kalinga"/>
+        <a:font script="Mlym" typeface="Kartika"/>
+        <a:font script="Laoo" typeface="DokChampa"/>
+        <a:font script="Sinh" typeface="Iskoola Pota"/>
+        <a:font script="Mong" typeface="Mongolian Baiti"/>
+        <a:font script="Viet" typeface="Arial"/>
+        <a:font script="Uigh" typeface="Microsoft Uighur"/>
+        <a:font script="Geor" typeface="Sylfaen"/>
+      </a:minorFont>
+    </a:fontScheme>
+    <a:fmtScheme name="Office">
+      <a:fillStyleLst>
+        <a:solidFill>
+          <a:schemeClr val="phClr"/>
+        </a:solidFill>
+        <a:gradFill rotWithShape="1">
+          <a:gsLst>
+            <a:gs pos="0">
+              <a:schemeClr val="phClr">
+                <a:lumMod val="110000"/>
+                <a:satMod val="105000"/>
+                <a:tint val="67000"/>
+              </a:schemeClr>
+            </a:gs>
+            <a:gs pos="50000">
+              <a:schemeClr val="phClr">
+                <a:lumMod val="105000"/>
+                <a:satMod val="103000"/>
+                <a:tint val="73000"/>
+              </a:schemeClr>
+            </a:gs>
+            <a:gs pos="100000">
+              <a:schemeClr val="phClr">
+                <a:lumMod val="105000"/>
+                <a:satMod val="109000"/>
+                <a:tint val="81000"/>
+              </a:schemeClr>
+            </a:gs>
+          </a:gsLst>
+          <a:lin ang="5400000" scaled="0"/>
+        </a:gradFill>
+        <a:gradFill rotWithShape="1">
+          <a:gsLst>
+            <a:gs pos="0">
+              <a:schemeClr val="phClr">
+                <a:satMod val="103000"/>
+                <a:lumMod val="102000"/>
+                <a:tint val="94000"/>
+              </a:schemeClr>
+            </a:gs>
+            <a:gs pos="50000">
+              <a:schemeClr val="phClr">
+                <a:satMod val="110000"/>
+                <a:lumMod val="100000"/>
+                <a:shade val="100000"/>
+              </a:schemeClr>
+            </a:gs>
+            <a:gs pos="100000">
+              <a:schemeClr val="phClr">
+                <a:lumMod val="99000"/>
+                <a:satMod val="120000"/>
+                <a:shade val="78000"/>
+              </a:schemeClr>
+            </a:gs>
+          </a:gsLst>
+          <a:lin ang="5400000" scaled="0"/>
+        </a:gradFill>
+      </a:fillStyleLst>
+      <a:lnStyleLst>
+        <a:ln w="6350" cap="flat" cmpd="sng" algn="ctr">
+          <a:solidFill>
+            <a:schemeClr val="phClr"/>
+          </a:solidFill>
+          <a:prstDash val="solid"/>
+          <a:miter lim="800000"/>
+        </a:ln>
+        <a:ln w="12700" cap="flat" cmpd="sng" algn="ctr">
+          <a:solidFill>
+            <a:schemeClr val="phClr"/>
+          </a:solidFill>
+          <a:prstDash val="solid"/>
+          <a:miter lim="800000"/>
+        </a:ln>
+        <a:ln w="19050" cap="flat" cmpd="sng" algn="ctr">
+          <a:solidFill>
+            <a:schemeClr val="phClr"/>
+          </a:solidFill>
+          <a:prstDash val="solid"/>
+          <a:miter lim="800000"/>
+        </a:ln>
+      </a:lnStyleLst>
+      <a:effectStyleLst>
+        <a:effectStyle>
+          <a:effectLst/>
+        </a:effectStyle>
+        <a:effectStyle>
+          <a:effectLst/>
+        </a:effectStyle>
+        <a:effectStyle>
+          <a:effectLst>
+            <a:outerShdw blurRad="57150" dist="19050" dir="5400000" algn="ctr" rotWithShape="0">
+              <a:srgbClr val="000000">
+                <a:alpha val="63000"/>
+              </a:srgbClr>
+            </a:outerShdw>
+          </a:effectLst>
+        </a:effectStyle>
+      </a:effectStyleLst>
+      <a:bgFillStyleLst>
+        <a:solidFill>
+          <a:schemeClr val="phClr"/>
+        </a:solidFill>
+        <a:solidFill>
+          <a:schemeClr val="phClr">
+            <a:tint val="95000"/>
+            <a:satMod val="170000"/>
+          </a:schemeClr>
+        </a:solidFill>
+        <a:gradFill rotWithShape="1">
+          <a:gsLst>
+            <a:gs pos="0">
+              <a:schemeClr val="phClr">
+                <a:tint val="93000"/>
+                <a:satMod val="150000"/>
+                <a:shade val="98000"/>
+                <a:lumMod val="102000"/>
+              </a:schemeClr>
+            </a:gs>
+            <a:gs pos="50000">
+              <a:schemeClr val="phClr">
+                <a:tint val="98000"/>
+                <a:satMod val="130000"/>
+                <a:shade val="90000"/>
+                <a:lumMod val="103000"/>
+              </a:schemeClr>
+            </a:gs>
+            <a:gs pos="100000">
+              <a:schemeClr val="phClr">
+                <a:shade val="63000"/>
+                <a:satMod val="120000"/>
+              </a:schemeClr>
+            </a:gs>
+          </a:gsLst>
+          <a:lin ang="5400000" scaled="0"/>
+        </a:gradFill>
+      </a:bgFillStyleLst>
+    </a:fmtScheme>
+  </a:themeElements>
+  <a:objectDefaults/>
+  <a:extraClrSchemeLst/>
+  <a:extLst>
+    <a:ext uri="{05A4C25C-085E-4340-85A3-A5531E510DB2}">
+      <thm15:themeFamily xmlns:thm15="http://schemas.microsoft.com/office/thememl/2012/main" name="Office Theme" id="{62F939B6-93AF-4DB8-9C6B-D6C7DFDC589F}" vid="{4A3C46E8-61CC-4603-A589-7422A47A8E4A}"/>
+    </a:ext>
+  </a:extLst>
+</a:theme>
 </file>
</xml_diff>